<commit_message>
add the technologies in clit files
</commit_message>
<xml_diff>
--- a/cloud-technologies/template/cover.pptx
+++ b/cloud-technologies/template/cover.pptx
@@ -104,6 +104,11 @@
       </a:defRPr>
     </a:lvl9pPr>
   </p:defaultTextStyle>
+  <p:extLst>
+    <p:ext uri="{EFAFB233-063F-42B5-8137-9DF3F51BA10A}">
+      <p15:sldGuideLst xmlns:p15="http://schemas.microsoft.com/office/powerpoint/2012/main"/>
+    </p:ext>
+  </p:extLst>
 </p:presentation>
 </file>
 
@@ -331,7 +336,7 @@
           <a:p>
             <a:fld id="{E50F295A-86F0-7549-A46D-3D7D130C0126}" type="datetimeFigureOut">
               <a:rPr lang="en-US" smtClean="0"/>
-              <a:t>5/15/18</a:t>
+              <a:t>5/17/18</a:t>
             </a:fld>
             <a:endParaRPr lang="en-US"/>
           </a:p>
@@ -630,7 +635,7 @@
           <a:p>
             <a:fld id="{E50F295A-86F0-7549-A46D-3D7D130C0126}" type="datetimeFigureOut">
               <a:rPr lang="en-US" smtClean="0"/>
-              <a:t>5/15/18</a:t>
+              <a:t>5/17/18</a:t>
             </a:fld>
             <a:endParaRPr lang="en-US"/>
           </a:p>
@@ -903,7 +908,7 @@
           <a:p>
             <a:fld id="{E50F295A-86F0-7549-A46D-3D7D130C0126}" type="datetimeFigureOut">
               <a:rPr lang="en-US" smtClean="0"/>
-              <a:t>5/15/18</a:t>
+              <a:t>5/17/18</a:t>
             </a:fld>
             <a:endParaRPr lang="en-US"/>
           </a:p>
@@ -1468,7 +1473,7 @@
           <a:p>
             <a:fld id="{E50F295A-86F0-7549-A46D-3D7D130C0126}" type="datetimeFigureOut">
               <a:rPr lang="en-US" smtClean="0"/>
-              <a:t>5/15/18</a:t>
+              <a:t>5/17/18</a:t>
             </a:fld>
             <a:endParaRPr lang="en-US"/>
           </a:p>
@@ -1741,7 +1746,7 @@
           <a:p>
             <a:fld id="{E50F295A-86F0-7549-A46D-3D7D130C0126}" type="datetimeFigureOut">
               <a:rPr lang="en-US" smtClean="0"/>
-              <a:t>5/15/18</a:t>
+              <a:t>5/17/18</a:t>
             </a:fld>
             <a:endParaRPr lang="en-US"/>
           </a:p>
@@ -2298,7 +2303,7 @@
           <a:p>
             <a:fld id="{E50F295A-86F0-7549-A46D-3D7D130C0126}" type="datetimeFigureOut">
               <a:rPr lang="en-US" smtClean="0"/>
-              <a:t>5/15/18</a:t>
+              <a:t>5/17/18</a:t>
             </a:fld>
             <a:endParaRPr lang="en-US"/>
           </a:p>
@@ -2620,7 +2625,7 @@
           <a:p>
             <a:fld id="{E50F295A-86F0-7549-A46D-3D7D130C0126}" type="datetimeFigureOut">
               <a:rPr lang="en-US" smtClean="0"/>
-              <a:t>5/15/18</a:t>
+              <a:t>5/17/18</a:t>
             </a:fld>
             <a:endParaRPr lang="en-US"/>
           </a:p>
@@ -2826,7 +2831,7 @@
           <a:p>
             <a:fld id="{E50F295A-86F0-7549-A46D-3D7D130C0126}" type="datetimeFigureOut">
               <a:rPr lang="en-US" smtClean="0"/>
-              <a:t>5/15/18</a:t>
+              <a:t>5/17/18</a:t>
             </a:fld>
             <a:endParaRPr lang="en-US"/>
           </a:p>
@@ -3037,7 +3042,7 @@
           <a:p>
             <a:fld id="{E50F295A-86F0-7549-A46D-3D7D130C0126}" type="datetimeFigureOut">
               <a:rPr lang="en-US" smtClean="0"/>
-              <a:t>5/15/18</a:t>
+              <a:t>5/17/18</a:t>
             </a:fld>
             <a:endParaRPr lang="en-US"/>
           </a:p>
@@ -3238,7 +3243,7 @@
           <a:p>
             <a:fld id="{E50F295A-86F0-7549-A46D-3D7D130C0126}" type="datetimeFigureOut">
               <a:rPr lang="en-US" smtClean="0"/>
-              <a:t>5/15/18</a:t>
+              <a:t>5/17/18</a:t>
             </a:fld>
             <a:endParaRPr lang="en-US"/>
           </a:p>
@@ -3511,7 +3516,7 @@
           <a:p>
             <a:fld id="{E50F295A-86F0-7549-A46D-3D7D130C0126}" type="datetimeFigureOut">
               <a:rPr lang="en-US" smtClean="0"/>
-              <a:t>5/15/18</a:t>
+              <a:t>5/17/18</a:t>
             </a:fld>
             <a:endParaRPr lang="en-US"/>
           </a:p>
@@ -3772,7 +3777,7 @@
           <a:p>
             <a:fld id="{E50F295A-86F0-7549-A46D-3D7D130C0126}" type="datetimeFigureOut">
               <a:rPr lang="en-US" smtClean="0"/>
-              <a:t>5/15/18</a:t>
+              <a:t>5/17/18</a:t>
             </a:fld>
             <a:endParaRPr lang="en-US"/>
           </a:p>
@@ -4173,7 +4178,7 @@
           <a:p>
             <a:fld id="{E50F295A-86F0-7549-A46D-3D7D130C0126}" type="datetimeFigureOut">
               <a:rPr lang="en-US" smtClean="0"/>
-              <a:t>5/15/18</a:t>
+              <a:t>5/17/18</a:t>
             </a:fld>
             <a:endParaRPr lang="en-US"/>
           </a:p>
@@ -4327,7 +4332,7 @@
           <a:p>
             <a:fld id="{E50F295A-86F0-7549-A46D-3D7D130C0126}" type="datetimeFigureOut">
               <a:rPr lang="en-US" smtClean="0"/>
-              <a:t>5/15/18</a:t>
+              <a:t>5/17/18</a:t>
             </a:fld>
             <a:endParaRPr lang="en-US"/>
           </a:p>
@@ -4447,7 +4452,7 @@
           <a:p>
             <a:fld id="{E50F295A-86F0-7549-A46D-3D7D130C0126}" type="datetimeFigureOut">
               <a:rPr lang="en-US" smtClean="0"/>
-              <a:t>5/15/18</a:t>
+              <a:t>5/17/18</a:t>
             </a:fld>
             <a:endParaRPr lang="en-US"/>
           </a:p>
@@ -4727,7 +4732,7 @@
           <a:p>
             <a:fld id="{E50F295A-86F0-7549-A46D-3D7D130C0126}" type="datetimeFigureOut">
               <a:rPr lang="en-US" smtClean="0"/>
-              <a:t>5/15/18</a:t>
+              <a:t>5/17/18</a:t>
             </a:fld>
             <a:endParaRPr lang="en-US"/>
           </a:p>
@@ -5016,7 +5021,7 @@
           <a:p>
             <a:fld id="{E50F295A-86F0-7549-A46D-3D7D130C0126}" type="datetimeFigureOut">
               <a:rPr lang="en-US" smtClean="0"/>
-              <a:t>5/15/18</a:t>
+              <a:t>5/17/18</a:t>
             </a:fld>
             <a:endParaRPr lang="en-US"/>
           </a:p>
@@ -5225,7 +5230,7 @@
           <a:p>
             <a:fld id="{E50F295A-86F0-7549-A46D-3D7D130C0126}" type="datetimeFigureOut">
               <a:rPr lang="en-US" smtClean="0"/>
-              <a:t>5/15/18</a:t>
+              <a:t>5/17/18</a:t>
             </a:fld>
             <a:endParaRPr lang="en-US"/>
           </a:p>
@@ -5762,7 +5767,11 @@
           <a:p>
             <a:r>
               <a:rPr lang="en-US" sz="7200" b="1" dirty="0" smtClean="0"/>
-              <a:t>Cloud Clusters</a:t>
+              <a:t>Cloud </a:t>
+            </a:r>
+            <a:r>
+              <a:rPr lang="en-US" sz="7200" b="1" dirty="0" smtClean="0"/>
+              <a:t>Technologies</a:t>
             </a:r>
             <a:endParaRPr lang="en-US" sz="7200" b="1" dirty="0"/>
           </a:p>
@@ -5788,22 +5797,31 @@
             </a:pPr>
             <a:r>
               <a:rPr lang="en-US" sz="2400" dirty="0"/>
-              <a:t>A handbook for services and deployments to create cloud </a:t>
+              <a:t>A </a:t>
             </a:r>
             <a:r>
               <a:rPr lang="en-US" sz="2400" dirty="0" smtClean="0"/>
-              <a:t>clusters</a:t>
-            </a:r>
-            <a:endParaRPr lang="en-US" sz="2400" dirty="0"/>
-          </a:p>
-          <a:p>
-            <a:pPr marL="0" indent="0">
+              <a:t>collection of technologies </a:t>
+            </a:r>
+          </a:p>
+          <a:p>
+            <a:pPr marL="0" indent="0" algn="ctr">
               <a:buNone/>
             </a:pPr>
             <a:r>
               <a:rPr lang="en-US" sz="2400" dirty="0" smtClean="0"/>
-              <a:t>_______________________________________</a:t>
-            </a:r>
+              <a:t>relevant for clouds and big data</a:t>
+            </a:r>
+          </a:p>
+          <a:p>
+            <a:pPr marL="0" indent="0" algn="ctr">
+              <a:buNone/>
+            </a:pPr>
+            <a:r>
+              <a:rPr lang="en-US" sz="2400" dirty="0" smtClean="0"/>
+              <a:t>_________________________</a:t>
+            </a:r>
+            <a:endParaRPr lang="en-US" sz="2400" dirty="0" smtClean="0"/>
           </a:p>
           <a:p>
             <a:pPr marL="0" indent="0">

</xml_diff>